<commit_message>
changes to final powerpoint
</commit_message>
<xml_diff>
--- a/module_10/part_2/deck_2.pptx
+++ b/module_10/part_2/deck_2.pptx
@@ -125,6 +125,11 @@
       </a:defRPr>
     </a:lvl9pPr>
   </p:defaultTextStyle>
+  <p:extLst>
+    <p:ext uri="{EFAFB233-063F-42B5-8137-9DF3F51BA10A}">
+      <p15:sldGuideLst xmlns:p15="http://schemas.microsoft.com/office/powerpoint/2012/main"/>
+    </p:ext>
+  </p:extLst>
 </p:presentation>
 </file>
 
@@ -3023,6 +3028,13 @@
   <p:clrMapOvr>
     <a:masterClrMapping/>
   </p:clrMapOvr>
+  <p:timing>
+    <p:tnLst>
+      <p:par>
+        <p:cTn id="1" dur="indefinite" restart="never" nodeType="tmRoot"/>
+      </p:par>
+    </p:tnLst>
+  </p:timing>
 </p:sld>
 </file>
 
@@ -3066,8 +3078,8 @@
           </a:p>
         </p:txBody>
       </p:sp>
-      <mc:AlternateContent xmlns:mc="http://schemas.openxmlformats.org/markup-compatibility/2006">
-        <mc:Choice xmlns:a14="http://schemas.microsoft.com/office/drawing/2010/main" Requires="a14">
+      <mc:AlternateContent xmlns:mc="http://schemas.openxmlformats.org/markup-compatibility/2006" xmlns:a14="http://schemas.microsoft.com/office/drawing/2010/main">
+        <mc:Choice Requires="a14">
           <p:sp>
             <p:nvSpPr>
               <p:cNvPr id="4" name="TextBox 3"/>
@@ -3090,6 +3102,7 @@
               </a:bodyPr>
               <a:lstStyle/>
               <a:p>
+                <a:pPr/>
                 <a14:m>
                   <m:oMathPara xmlns:m="http://schemas.openxmlformats.org/officeDocument/2006/math">
                     <m:oMathParaPr>
@@ -3285,7 +3298,7 @@
             </p:txBody>
           </p:sp>
         </mc:Choice>
-        <mc:Fallback>
+        <mc:Fallback xmlns="">
           <p:sp>
             <p:nvSpPr>
               <p:cNvPr id="4" name="TextBox 3"/>
@@ -3364,6 +3377,13 @@
   <p:clrMapOvr>
     <a:masterClrMapping/>
   </p:clrMapOvr>
+  <p:timing>
+    <p:tnLst>
+      <p:par>
+        <p:cTn id="1" dur="indefinite" restart="never" nodeType="tmRoot"/>
+      </p:par>
+    </p:tnLst>
+  </p:timing>
 </p:sld>
 </file>
 
@@ -3407,8 +3427,8 @@
           </a:p>
         </p:txBody>
       </p:sp>
-      <mc:AlternateContent xmlns:mc="http://schemas.openxmlformats.org/markup-compatibility/2006">
-        <mc:Choice xmlns:a14="http://schemas.microsoft.com/office/drawing/2010/main" Requires="a14">
+      <mc:AlternateContent xmlns:mc="http://schemas.openxmlformats.org/markup-compatibility/2006" xmlns:a14="http://schemas.microsoft.com/office/drawing/2010/main">
+        <mc:Choice Requires="a14">
           <p:sp>
             <p:nvSpPr>
               <p:cNvPr id="4" name="TextBox 3"/>
@@ -3431,6 +3451,7 @@
               </a:bodyPr>
               <a:lstStyle/>
               <a:p>
+                <a:pPr/>
                 <a14:m>
                   <m:oMathPara xmlns:m="http://schemas.openxmlformats.org/officeDocument/2006/math">
                     <m:oMathParaPr>
@@ -3626,7 +3647,7 @@
             </p:txBody>
           </p:sp>
         </mc:Choice>
-        <mc:Fallback>
+        <mc:Fallback xmlns="">
           <p:sp>
             <p:nvSpPr>
               <p:cNvPr id="4" name="TextBox 3"/>
@@ -3735,6 +3756,13 @@
   <p:clrMapOvr>
     <a:masterClrMapping/>
   </p:clrMapOvr>
+  <p:timing>
+    <p:tnLst>
+      <p:par>
+        <p:cTn id="1" dur="indefinite" restart="never" nodeType="tmRoot"/>
+      </p:par>
+    </p:tnLst>
+  </p:timing>
 </p:sld>
 </file>
 
@@ -3778,8 +3806,8 @@
           </a:p>
         </p:txBody>
       </p:sp>
-      <mc:AlternateContent xmlns:mc="http://schemas.openxmlformats.org/markup-compatibility/2006">
-        <mc:Choice xmlns:a14="http://schemas.microsoft.com/office/drawing/2010/main" Requires="a14">
+      <mc:AlternateContent xmlns:mc="http://schemas.openxmlformats.org/markup-compatibility/2006" xmlns:a14="http://schemas.microsoft.com/office/drawing/2010/main">
+        <mc:Choice Requires="a14">
           <p:sp>
             <p:nvSpPr>
               <p:cNvPr id="4" name="TextBox 3"/>
@@ -3802,6 +3830,7 @@
               </a:bodyPr>
               <a:lstStyle/>
               <a:p>
+                <a:pPr/>
                 <a14:m>
                   <m:oMathPara xmlns:m="http://schemas.openxmlformats.org/officeDocument/2006/math">
                     <m:oMathParaPr>
@@ -3997,7 +4026,7 @@
             </p:txBody>
           </p:sp>
         </mc:Choice>
-        <mc:Fallback>
+        <mc:Fallback xmlns="">
           <p:sp>
             <p:nvSpPr>
               <p:cNvPr id="4" name="TextBox 3"/>
@@ -4046,6 +4075,13 @@
   <p:clrMapOvr>
     <a:masterClrMapping/>
   </p:clrMapOvr>
+  <p:timing>
+    <p:tnLst>
+      <p:par>
+        <p:cTn id="1" dur="indefinite" restart="never" nodeType="tmRoot"/>
+      </p:par>
+    </p:tnLst>
+  </p:timing>
 </p:sld>
 </file>
 
@@ -4089,8 +4125,8 @@
           </a:p>
         </p:txBody>
       </p:sp>
-      <mc:AlternateContent xmlns:mc="http://schemas.openxmlformats.org/markup-compatibility/2006">
-        <mc:Choice xmlns:a14="http://schemas.microsoft.com/office/drawing/2010/main" Requires="a14">
+      <mc:AlternateContent xmlns:mc="http://schemas.openxmlformats.org/markup-compatibility/2006" xmlns:a14="http://schemas.microsoft.com/office/drawing/2010/main">
+        <mc:Choice Requires="a14">
           <p:sp>
             <p:nvSpPr>
               <p:cNvPr id="4" name="TextBox 3"/>
@@ -4113,6 +4149,7 @@
               </a:bodyPr>
               <a:lstStyle/>
               <a:p>
+                <a:pPr/>
                 <a14:m>
                   <m:oMathPara xmlns:m="http://schemas.openxmlformats.org/officeDocument/2006/math">
                     <m:oMathParaPr>
@@ -4308,7 +4345,7 @@
             </p:txBody>
           </p:sp>
         </mc:Choice>
-        <mc:Fallback>
+        <mc:Fallback xmlns="">
           <p:sp>
             <p:nvSpPr>
               <p:cNvPr id="4" name="TextBox 3"/>
@@ -4387,6 +4424,13 @@
   <p:clrMapOvr>
     <a:masterClrMapping/>
   </p:clrMapOvr>
+  <p:timing>
+    <p:tnLst>
+      <p:par>
+        <p:cTn id="1" dur="indefinite" restart="never" nodeType="tmRoot"/>
+      </p:par>
+    </p:tnLst>
+  </p:timing>
 </p:sld>
 </file>
 
@@ -4430,8 +4474,8 @@
           </a:p>
         </p:txBody>
       </p:sp>
-      <mc:AlternateContent xmlns:mc="http://schemas.openxmlformats.org/markup-compatibility/2006">
-        <mc:Choice xmlns:a14="http://schemas.microsoft.com/office/drawing/2010/main" Requires="a14">
+      <mc:AlternateContent xmlns:mc="http://schemas.openxmlformats.org/markup-compatibility/2006" xmlns:a14="http://schemas.microsoft.com/office/drawing/2010/main">
+        <mc:Choice Requires="a14">
           <p:sp>
             <p:nvSpPr>
               <p:cNvPr id="4" name="TextBox 3"/>
@@ -4454,6 +4498,7 @@
               </a:bodyPr>
               <a:lstStyle/>
               <a:p>
+                <a:pPr/>
                 <a14:m>
                   <m:oMathPara xmlns:m="http://schemas.openxmlformats.org/officeDocument/2006/math">
                     <m:oMathParaPr>
@@ -4649,7 +4694,7 @@
             </p:txBody>
           </p:sp>
         </mc:Choice>
-        <mc:Fallback>
+        <mc:Fallback xmlns="">
           <p:sp>
             <p:nvSpPr>
               <p:cNvPr id="4" name="TextBox 3"/>
@@ -4758,6 +4803,13 @@
   <p:clrMapOvr>
     <a:masterClrMapping/>
   </p:clrMapOvr>
+  <p:timing>
+    <p:tnLst>
+      <p:par>
+        <p:cTn id="1" dur="indefinite" restart="never" nodeType="tmRoot"/>
+      </p:par>
+    </p:tnLst>
+  </p:timing>
 </p:sld>
 </file>
 
@@ -4846,6 +4898,13 @@
   <p:clrMapOvr>
     <a:masterClrMapping/>
   </p:clrMapOvr>
+  <p:timing>
+    <p:tnLst>
+      <p:par>
+        <p:cTn id="1" dur="indefinite" restart="never" nodeType="tmRoot"/>
+      </p:par>
+    </p:tnLst>
+  </p:timing>
 </p:sld>
 </file>
 
@@ -4924,8 +4983,8 @@
           </a:p>
         </p:txBody>
       </p:sp>
-      <mc:AlternateContent xmlns:mc="http://schemas.openxmlformats.org/markup-compatibility/2006">
-        <mc:Choice xmlns:a14="http://schemas.microsoft.com/office/drawing/2010/main" Requires="a14">
+      <mc:AlternateContent xmlns:mc="http://schemas.openxmlformats.org/markup-compatibility/2006" xmlns:a14="http://schemas.microsoft.com/office/drawing/2010/main">
+        <mc:Choice Requires="a14">
           <p:sp>
             <p:nvSpPr>
               <p:cNvPr id="4" name="TextBox 3"/>
@@ -4948,6 +5007,7 @@
               </a:bodyPr>
               <a:lstStyle/>
               <a:p>
+                <a:pPr/>
                 <a14:m>
                   <m:oMathPara xmlns:m="http://schemas.openxmlformats.org/officeDocument/2006/math">
                     <m:oMathParaPr>
@@ -4993,7 +5053,7 @@
             </p:txBody>
           </p:sp>
         </mc:Choice>
-        <mc:Fallback>
+        <mc:Fallback xmlns="">
           <p:sp>
             <p:nvSpPr>
               <p:cNvPr id="4" name="TextBox 3"/>
@@ -5032,8 +5092,8 @@
           </p:sp>
         </mc:Fallback>
       </mc:AlternateContent>
-      <mc:AlternateContent xmlns:mc="http://schemas.openxmlformats.org/markup-compatibility/2006">
-        <mc:Choice xmlns:a14="http://schemas.microsoft.com/office/drawing/2010/main" Requires="a14">
+      <mc:AlternateContent xmlns:mc="http://schemas.openxmlformats.org/markup-compatibility/2006" xmlns:a14="http://schemas.microsoft.com/office/drawing/2010/main">
+        <mc:Choice Requires="a14">
           <p:sp>
             <p:nvSpPr>
               <p:cNvPr id="7" name="TextBox 6"/>
@@ -5056,6 +5116,7 @@
               </a:bodyPr>
               <a:lstStyle/>
               <a:p>
+                <a:pPr/>
                 <a14:m>
                   <m:oMathPara xmlns:m="http://schemas.openxmlformats.org/officeDocument/2006/math">
                     <m:oMathParaPr>
@@ -5101,7 +5162,7 @@
             </p:txBody>
           </p:sp>
         </mc:Choice>
-        <mc:Fallback>
+        <mc:Fallback xmlns="">
           <p:sp>
             <p:nvSpPr>
               <p:cNvPr id="7" name="TextBox 6"/>
@@ -5150,6 +5211,13 @@
   <p:clrMapOvr>
     <a:masterClrMapping/>
   </p:clrMapOvr>
+  <p:timing>
+    <p:tnLst>
+      <p:par>
+        <p:cTn id="1" dur="indefinite" restart="never" nodeType="tmRoot"/>
+      </p:par>
+    </p:tnLst>
+  </p:timing>
 </p:sld>
 </file>
 
@@ -5228,8 +5296,8 @@
           </a:p>
         </p:txBody>
       </p:sp>
-      <mc:AlternateContent xmlns:mc="http://schemas.openxmlformats.org/markup-compatibility/2006">
-        <mc:Choice xmlns:a14="http://schemas.microsoft.com/office/drawing/2010/main" Requires="a14">
+      <mc:AlternateContent xmlns:mc="http://schemas.openxmlformats.org/markup-compatibility/2006" xmlns:a14="http://schemas.microsoft.com/office/drawing/2010/main">
+        <mc:Choice Requires="a14">
           <p:sp>
             <p:nvSpPr>
               <p:cNvPr id="4" name="TextBox 3"/>
@@ -5252,6 +5320,7 @@
               </a:bodyPr>
               <a:lstStyle/>
               <a:p>
+                <a:pPr/>
                 <a14:m>
                   <m:oMathPara xmlns:m="http://schemas.openxmlformats.org/officeDocument/2006/math">
                     <m:oMathParaPr>
@@ -5297,7 +5366,7 @@
             </p:txBody>
           </p:sp>
         </mc:Choice>
-        <mc:Fallback>
+        <mc:Fallback xmlns="">
           <p:sp>
             <p:nvSpPr>
               <p:cNvPr id="4" name="TextBox 3"/>
@@ -5336,8 +5405,8 @@
           </p:sp>
         </mc:Fallback>
       </mc:AlternateContent>
-      <mc:AlternateContent xmlns:mc="http://schemas.openxmlformats.org/markup-compatibility/2006">
-        <mc:Choice xmlns:a14="http://schemas.microsoft.com/office/drawing/2010/main" Requires="a14">
+      <mc:AlternateContent xmlns:mc="http://schemas.openxmlformats.org/markup-compatibility/2006" xmlns:a14="http://schemas.microsoft.com/office/drawing/2010/main">
+        <mc:Choice Requires="a14">
           <p:sp>
             <p:nvSpPr>
               <p:cNvPr id="6" name="TextBox 5"/>
@@ -5360,6 +5429,7 @@
               </a:bodyPr>
               <a:lstStyle/>
               <a:p>
+                <a:pPr/>
                 <a14:m>
                   <m:oMathPara xmlns:m="http://schemas.openxmlformats.org/officeDocument/2006/math">
                     <m:oMathParaPr>
@@ -5411,7 +5481,7 @@
             </p:txBody>
           </p:sp>
         </mc:Choice>
-        <mc:Fallback>
+        <mc:Fallback xmlns="">
           <p:sp>
             <p:nvSpPr>
               <p:cNvPr id="6" name="TextBox 5"/>
@@ -5450,8 +5520,8 @@
           </p:sp>
         </mc:Fallback>
       </mc:AlternateContent>
-      <mc:AlternateContent xmlns:mc="http://schemas.openxmlformats.org/markup-compatibility/2006">
-        <mc:Choice xmlns:a14="http://schemas.microsoft.com/office/drawing/2010/main" Requires="a14">
+      <mc:AlternateContent xmlns:mc="http://schemas.openxmlformats.org/markup-compatibility/2006" xmlns:a14="http://schemas.microsoft.com/office/drawing/2010/main">
+        <mc:Choice Requires="a14">
           <p:sp>
             <p:nvSpPr>
               <p:cNvPr id="7" name="TextBox 6"/>
@@ -5474,6 +5544,7 @@
               </a:bodyPr>
               <a:lstStyle/>
               <a:p>
+                <a:pPr/>
                 <a14:m>
                   <m:oMathPara xmlns:m="http://schemas.openxmlformats.org/officeDocument/2006/math">
                     <m:oMathParaPr>
@@ -5519,7 +5590,7 @@
             </p:txBody>
           </p:sp>
         </mc:Choice>
-        <mc:Fallback>
+        <mc:Fallback xmlns="">
           <p:sp>
             <p:nvSpPr>
               <p:cNvPr id="7" name="TextBox 6"/>
@@ -5558,8 +5629,8 @@
           </p:sp>
         </mc:Fallback>
       </mc:AlternateContent>
-      <mc:AlternateContent xmlns:mc="http://schemas.openxmlformats.org/markup-compatibility/2006">
-        <mc:Choice xmlns:a14="http://schemas.microsoft.com/office/drawing/2010/main" Requires="a14">
+      <mc:AlternateContent xmlns:mc="http://schemas.openxmlformats.org/markup-compatibility/2006" xmlns:a14="http://schemas.microsoft.com/office/drawing/2010/main">
+        <mc:Choice Requires="a14">
           <p:sp>
             <p:nvSpPr>
               <p:cNvPr id="8" name="TextBox 7"/>
@@ -5582,6 +5653,7 @@
               </a:bodyPr>
               <a:lstStyle/>
               <a:p>
+                <a:pPr/>
                 <a14:m>
                   <m:oMathPara xmlns:m="http://schemas.openxmlformats.org/officeDocument/2006/math">
                     <m:oMathParaPr>
@@ -5633,7 +5705,7 @@
             </p:txBody>
           </p:sp>
         </mc:Choice>
-        <mc:Fallback>
+        <mc:Fallback xmlns="">
           <p:sp>
             <p:nvSpPr>
               <p:cNvPr id="8" name="TextBox 7"/>
@@ -5682,6 +5754,13 @@
   <p:clrMapOvr>
     <a:masterClrMapping/>
   </p:clrMapOvr>
+  <p:timing>
+    <p:tnLst>
+      <p:par>
+        <p:cTn id="1" dur="indefinite" restart="never" nodeType="tmRoot"/>
+      </p:par>
+    </p:tnLst>
+  </p:timing>
 </p:sld>
 </file>
 
@@ -5760,8 +5839,8 @@
           </a:p>
         </p:txBody>
       </p:sp>
-      <mc:AlternateContent xmlns:mc="http://schemas.openxmlformats.org/markup-compatibility/2006">
-        <mc:Choice xmlns:a14="http://schemas.microsoft.com/office/drawing/2010/main" Requires="a14">
+      <mc:AlternateContent xmlns:mc="http://schemas.openxmlformats.org/markup-compatibility/2006" xmlns:a14="http://schemas.microsoft.com/office/drawing/2010/main">
+        <mc:Choice Requires="a14">
           <p:sp>
             <p:nvSpPr>
               <p:cNvPr id="8" name="TextBox 7"/>
@@ -5784,6 +5863,7 @@
               </a:bodyPr>
               <a:lstStyle/>
               <a:p>
+                <a:pPr/>
                 <a14:m>
                   <m:oMathPara xmlns:m="http://schemas.openxmlformats.org/officeDocument/2006/math">
                     <m:oMathParaPr>
@@ -5922,7 +6002,7 @@
             </p:txBody>
           </p:sp>
         </mc:Choice>
-        <mc:Fallback>
+        <mc:Fallback xmlns="">
           <p:sp>
             <p:nvSpPr>
               <p:cNvPr id="8" name="TextBox 7"/>
@@ -5971,6 +6051,13 @@
   <p:clrMapOvr>
     <a:masterClrMapping/>
   </p:clrMapOvr>
+  <p:timing>
+    <p:tnLst>
+      <p:par>
+        <p:cTn id="1" dur="indefinite" restart="never" nodeType="tmRoot"/>
+      </p:par>
+    </p:tnLst>
+  </p:timing>
 </p:sld>
 </file>
 
@@ -6016,8 +6103,8 @@
           </a:p>
         </p:txBody>
       </p:sp>
-      <mc:AlternateContent xmlns:mc="http://schemas.openxmlformats.org/markup-compatibility/2006">
-        <mc:Choice xmlns:a14="http://schemas.microsoft.com/office/drawing/2010/main" Requires="a14">
+      <mc:AlternateContent xmlns:mc="http://schemas.openxmlformats.org/markup-compatibility/2006" xmlns:a14="http://schemas.microsoft.com/office/drawing/2010/main">
+        <mc:Choice Requires="a14">
           <p:sp>
             <p:nvSpPr>
               <p:cNvPr id="8" name="TextBox 7"/>
@@ -6040,6 +6127,7 @@
               </a:bodyPr>
               <a:lstStyle/>
               <a:p>
+                <a:pPr/>
                 <a14:m>
                   <m:oMathPara xmlns:m="http://schemas.openxmlformats.org/officeDocument/2006/math">
                     <m:oMathParaPr>
@@ -6178,7 +6266,7 @@
             </p:txBody>
           </p:sp>
         </mc:Choice>
-        <mc:Fallback>
+        <mc:Fallback xmlns="">
           <p:sp>
             <p:nvSpPr>
               <p:cNvPr id="8" name="TextBox 7"/>
@@ -6261,6 +6349,13 @@
   <p:clrMapOvr>
     <a:masterClrMapping/>
   </p:clrMapOvr>
+  <p:timing>
+    <p:tnLst>
+      <p:par>
+        <p:cTn id="1" dur="indefinite" restart="never" nodeType="tmRoot"/>
+      </p:par>
+    </p:tnLst>
+  </p:timing>
 </p:sld>
 </file>
 
@@ -6359,6 +6454,13 @@
   <p:clrMapOvr>
     <a:masterClrMapping/>
   </p:clrMapOvr>
+  <p:timing>
+    <p:tnLst>
+      <p:par>
+        <p:cTn id="1" dur="indefinite" restart="never" nodeType="tmRoot"/>
+      </p:par>
+    </p:tnLst>
+  </p:timing>
 </p:sld>
 </file>
 
@@ -6404,8 +6506,8 @@
           </a:p>
         </p:txBody>
       </p:sp>
-      <mc:AlternateContent xmlns:mc="http://schemas.openxmlformats.org/markup-compatibility/2006">
-        <mc:Choice xmlns:a14="http://schemas.microsoft.com/office/drawing/2010/main" Requires="a14">
+      <mc:AlternateContent xmlns:mc="http://schemas.openxmlformats.org/markup-compatibility/2006" xmlns:a14="http://schemas.microsoft.com/office/drawing/2010/main">
+        <mc:Choice Requires="a14">
           <p:sp>
             <p:nvSpPr>
               <p:cNvPr id="8" name="TextBox 7"/>
@@ -6428,6 +6530,7 @@
               </a:bodyPr>
               <a:lstStyle/>
               <a:p>
+                <a:pPr/>
                 <a14:m>
                   <m:oMathPara xmlns:m="http://schemas.openxmlformats.org/officeDocument/2006/math">
                     <m:oMathParaPr>
@@ -6566,7 +6669,7 @@
             </p:txBody>
           </p:sp>
         </mc:Choice>
-        <mc:Fallback>
+        <mc:Fallback xmlns="">
           <p:sp>
             <p:nvSpPr>
               <p:cNvPr id="8" name="TextBox 7"/>
@@ -6679,6 +6782,13 @@
   <p:clrMapOvr>
     <a:masterClrMapping/>
   </p:clrMapOvr>
+  <p:timing>
+    <p:tnLst>
+      <p:par>
+        <p:cTn id="1" dur="indefinite" restart="never" nodeType="tmRoot"/>
+      </p:par>
+    </p:tnLst>
+  </p:timing>
 </p:sld>
 </file>
 
@@ -6734,18 +6844,14 @@
             </a:r>
             <a:r>
               <a:rPr lang="en-US" dirty="0" smtClean="0"/>
-              <a:t>ORs</a:t>
-            </a:r>
-            <a:r>
-              <a:rPr lang="en-US" dirty="0" smtClean="0"/>
-              <a:t>, not odds or ORs. </a:t>
+              <a:t>ORs, not odds or ORs. </a:t>
             </a:r>
             <a:endParaRPr lang="en-US" dirty="0"/>
           </a:p>
         </p:txBody>
       </p:sp>
-      <mc:AlternateContent xmlns:mc="http://schemas.openxmlformats.org/markup-compatibility/2006">
-        <mc:Choice xmlns:a14="http://schemas.microsoft.com/office/drawing/2010/main" Requires="a14">
+      <mc:AlternateContent xmlns:mc="http://schemas.openxmlformats.org/markup-compatibility/2006" xmlns:a14="http://schemas.microsoft.com/office/drawing/2010/main">
+        <mc:Choice Requires="a14">
           <p:sp>
             <p:nvSpPr>
               <p:cNvPr id="8" name="TextBox 7"/>
@@ -6768,6 +6874,7 @@
               </a:bodyPr>
               <a:lstStyle/>
               <a:p>
+                <a:pPr/>
                 <a14:m>
                   <m:oMathPara xmlns:m="http://schemas.openxmlformats.org/officeDocument/2006/math">
                     <m:oMathParaPr>
@@ -6806,7 +6913,7 @@
             </p:txBody>
           </p:sp>
         </mc:Choice>
-        <mc:Fallback>
+        <mc:Fallback xmlns="">
           <p:sp>
             <p:nvSpPr>
               <p:cNvPr id="8" name="TextBox 7"/>
@@ -6855,6 +6962,13 @@
   <p:clrMapOvr>
     <a:masterClrMapping/>
   </p:clrMapOvr>
+  <p:timing>
+    <p:tnLst>
+      <p:par>
+        <p:cTn id="1" dur="indefinite" restart="never" nodeType="tmRoot"/>
+      </p:par>
+    </p:tnLst>
+  </p:timing>
 </p:sld>
 </file>
 
@@ -6910,18 +7024,14 @@
             </a:r>
             <a:r>
               <a:rPr lang="en-US" dirty="0" smtClean="0"/>
-              <a:t>ORs</a:t>
-            </a:r>
-            <a:r>
-              <a:rPr lang="en-US" dirty="0" smtClean="0"/>
-              <a:t>, not odds or ORs. </a:t>
+              <a:t>ORs, not odds or ORs. </a:t>
             </a:r>
             <a:endParaRPr lang="en-US" dirty="0"/>
           </a:p>
         </p:txBody>
       </p:sp>
-      <mc:AlternateContent xmlns:mc="http://schemas.openxmlformats.org/markup-compatibility/2006">
-        <mc:Choice xmlns:a14="http://schemas.microsoft.com/office/drawing/2010/main" Requires="a14">
+      <mc:AlternateContent xmlns:mc="http://schemas.openxmlformats.org/markup-compatibility/2006" xmlns:a14="http://schemas.microsoft.com/office/drawing/2010/main">
+        <mc:Choice Requires="a14">
           <p:sp>
             <p:nvSpPr>
               <p:cNvPr id="8" name="TextBox 7"/>
@@ -6944,6 +7054,7 @@
               </a:bodyPr>
               <a:lstStyle/>
               <a:p>
+                <a:pPr/>
                 <a14:m>
                   <m:oMathPara xmlns:m="http://schemas.openxmlformats.org/officeDocument/2006/math">
                     <m:oMathParaPr>
@@ -6982,7 +7093,7 @@
             </p:txBody>
           </p:sp>
         </mc:Choice>
-        <mc:Fallback>
+        <mc:Fallback xmlns="">
           <p:sp>
             <p:nvSpPr>
               <p:cNvPr id="8" name="TextBox 7"/>
@@ -7031,8 +7142,8 @@
             </p:nvSpPr>
             <p:spPr>
               <a:xfrm>
-                <a:off x="3100230" y="4532453"/>
-                <a:ext cx="5727145" cy="830997"/>
+                <a:off x="3232427" y="4584704"/>
+                <a:ext cx="6538265" cy="830997"/>
               </a:xfrm>
               <a:prstGeom prst="rect">
                 <a:avLst/>
@@ -7046,50 +7157,57 @@
               <a:lstStyle/>
               <a:p>
                 <a14:m>
-                  <m:oMath xmlns:m="http://schemas.openxmlformats.org/officeDocument/2006/math">
-                    <m:r>
-                      <a:rPr lang="en-US" sz="5400" b="0" i="1" smtClean="0">
-                        <a:latin typeface="Cambria Math" panose="02040503050406030204" pitchFamily="18" charset="0"/>
-                      </a:rPr>
-                      <m:t>𝑂𝑅</m:t>
-                    </m:r>
-                    <m:r>
-                      <a:rPr lang="en-US" sz="5400" b="0" i="1" smtClean="0">
-                        <a:latin typeface="Cambria Math" panose="02040503050406030204" pitchFamily="18" charset="0"/>
-                      </a:rPr>
-                      <m:t>=</m:t>
-                    </m:r>
-                    <m:sSup>
-                      <m:sSupPr>
-                        <m:ctrlPr>
-                          <a:rPr lang="en-US" sz="5400" b="0" i="1" smtClean="0">
-                            <a:latin typeface="Cambria Math" panose="02040503050406030204" pitchFamily="18" charset="0"/>
-                          </a:rPr>
-                        </m:ctrlPr>
-                      </m:sSupPr>
-                      <m:e>
-                        <m:r>
-                          <a:rPr lang="en-US" sz="5400" b="0" i="1" smtClean="0">
-                            <a:latin typeface="Cambria Math" panose="02040503050406030204" pitchFamily="18" charset="0"/>
-                          </a:rPr>
-                          <m:t>𝑒</m:t>
-                        </m:r>
-                      </m:e>
-                      <m:sup>
-                        <m:r>
-                          <a:rPr lang="en-US" sz="5400" b="0" i="1" smtClean="0">
-                            <a:latin typeface="Cambria Math" panose="02040503050406030204" pitchFamily="18" charset="0"/>
-                          </a:rPr>
-                          <m:t>0.3483</m:t>
-                        </m:r>
-                      </m:sup>
-                    </m:sSup>
-                  </m:oMath>
+                  <m:oMathPara xmlns:m="http://schemas.openxmlformats.org/officeDocument/2006/math">
+                    <m:oMathParaPr>
+                      <m:jc m:val="centerGroup"/>
+                    </m:oMathParaPr>
+                    <m:oMath xmlns:m="http://schemas.openxmlformats.org/officeDocument/2006/math">
+                      <m:r>
+                        <a:rPr lang="en-US" sz="5400" b="0" i="1" smtClean="0">
+                          <a:latin typeface="Cambria Math" panose="02040503050406030204" pitchFamily="18" charset="0"/>
+                        </a:rPr>
+                        <m:t>𝑂𝑅</m:t>
+                      </m:r>
+                      <m:r>
+                        <a:rPr lang="en-US" sz="5400" b="0" i="1" smtClean="0">
+                          <a:latin typeface="Cambria Math" panose="02040503050406030204" pitchFamily="18" charset="0"/>
+                        </a:rPr>
+                        <m:t>=</m:t>
+                      </m:r>
+                      <m:sSup>
+                        <m:sSupPr>
+                          <m:ctrlPr>
+                            <a:rPr lang="en-US" sz="5400" b="0" i="1" smtClean="0">
+                              <a:latin typeface="Cambria Math" panose="02040503050406030204" pitchFamily="18" charset="0"/>
+                            </a:rPr>
+                          </m:ctrlPr>
+                        </m:sSupPr>
+                        <m:e>
+                          <m:r>
+                            <a:rPr lang="en-US" sz="5400" b="0" i="1" smtClean="0">
+                              <a:latin typeface="Cambria Math" panose="02040503050406030204" pitchFamily="18" charset="0"/>
+                            </a:rPr>
+                            <m:t>𝑒</m:t>
+                          </m:r>
+                        </m:e>
+                        <m:sup>
+                          <m:r>
+                            <a:rPr lang="en-US" sz="5400" b="0" i="1" smtClean="0">
+                              <a:latin typeface="Cambria Math" panose="02040503050406030204" pitchFamily="18" charset="0"/>
+                            </a:rPr>
+                            <m:t>0.3483</m:t>
+                          </m:r>
+                        </m:sup>
+                      </m:sSup>
+                      <m:r>
+                        <a:rPr lang="en-US" sz="5400" b="0" i="1" smtClean="0">
+                          <a:latin typeface="Cambria Math" panose="02040503050406030204" pitchFamily="18" charset="0"/>
+                        </a:rPr>
+                        <m:t>=1.417</m:t>
+                      </m:r>
+                    </m:oMath>
+                  </m:oMathPara>
                 </a14:m>
-                <a:r>
-                  <a:rPr lang="en-US" sz="5400" dirty="0" smtClean="0"/>
-                  <a:t>=1.417</a:t>
-                </a:r>
                 <a:endParaRPr lang="en-US" sz="5400" dirty="0"/>
               </a:p>
             </p:txBody>
@@ -7106,8 +7224,8 @@
             </p:nvSpPr>
             <p:spPr>
               <a:xfrm>
-                <a:off x="3100230" y="4532453"/>
-                <a:ext cx="5727145" cy="830997"/>
+                <a:off x="3232427" y="4584704"/>
+                <a:ext cx="6538265" cy="830997"/>
               </a:xfrm>
               <a:prstGeom prst="rect">
                 <a:avLst/>
@@ -7115,7 +7233,7 @@
               <a:blipFill>
                 <a:blip r:embed="rId3"/>
                 <a:stretch>
-                  <a:fillRect t="-25735" r="-6390" b="-50000"/>
+                  <a:fillRect/>
                 </a:stretch>
               </a:blipFill>
             </p:spPr>
@@ -7144,6 +7262,13 @@
   <p:clrMapOvr>
     <a:masterClrMapping/>
   </p:clrMapOvr>
+  <p:timing>
+    <p:tnLst>
+      <p:par>
+        <p:cTn id="1" dur="indefinite" restart="never" nodeType="tmRoot"/>
+      </p:par>
+    </p:tnLst>
+  </p:timing>
 </p:sld>
 </file>
 
@@ -7232,8 +7357,8 @@
           </a:p>
         </p:txBody>
       </p:sp>
-      <mc:AlternateContent xmlns:mc="http://schemas.openxmlformats.org/markup-compatibility/2006">
-        <mc:Choice xmlns:a14="http://schemas.microsoft.com/office/drawing/2010/main" Requires="a14">
+      <mc:AlternateContent xmlns:mc="http://schemas.openxmlformats.org/markup-compatibility/2006" xmlns:a14="http://schemas.microsoft.com/office/drawing/2010/main">
+        <mc:Choice Requires="a14">
           <p:sp>
             <p:nvSpPr>
               <p:cNvPr id="4" name="TextBox 3"/>
@@ -7256,6 +7381,7 @@
               </a:bodyPr>
               <a:lstStyle/>
               <a:p>
+                <a:pPr/>
                 <a14:m>
                   <m:oMathPara xmlns:m="http://schemas.openxmlformats.org/officeDocument/2006/math">
                     <m:oMathParaPr>
@@ -7313,7 +7439,7 @@
             </p:txBody>
           </p:sp>
         </mc:Choice>
-        <mc:Fallback>
+        <mc:Fallback xmlns="">
           <p:sp>
             <p:nvSpPr>
               <p:cNvPr id="4" name="TextBox 3"/>
@@ -7362,6 +7488,13 @@
   <p:clrMapOvr>
     <a:masterClrMapping/>
   </p:clrMapOvr>
+  <p:timing>
+    <p:tnLst>
+      <p:par>
+        <p:cTn id="1" dur="indefinite" restart="never" nodeType="tmRoot"/>
+      </p:par>
+    </p:tnLst>
+  </p:timing>
 </p:sld>
 </file>
 
@@ -7456,6 +7589,13 @@
   <p:clrMapOvr>
     <a:masterClrMapping/>
   </p:clrMapOvr>
+  <p:timing>
+    <p:tnLst>
+      <p:par>
+        <p:cTn id="1" dur="indefinite" restart="never" nodeType="tmRoot"/>
+      </p:par>
+    </p:tnLst>
+  </p:timing>
 </p:sld>
 </file>
 
@@ -7540,8 +7680,8 @@
           </a:p>
         </p:txBody>
       </p:sp>
-      <mc:AlternateContent xmlns:mc="http://schemas.openxmlformats.org/markup-compatibility/2006">
-        <mc:Choice xmlns:a14="http://schemas.microsoft.com/office/drawing/2010/main" Requires="a14">
+      <mc:AlternateContent xmlns:mc="http://schemas.openxmlformats.org/markup-compatibility/2006" xmlns:a14="http://schemas.microsoft.com/office/drawing/2010/main">
+        <mc:Choice Requires="a14">
           <p:sp>
             <p:nvSpPr>
               <p:cNvPr id="4" name="TextBox 3"/>
@@ -7564,6 +7704,7 @@
               </a:bodyPr>
               <a:lstStyle/>
               <a:p>
+                <a:pPr/>
                 <a14:m>
                   <m:oMathPara xmlns:m="http://schemas.openxmlformats.org/officeDocument/2006/math">
                     <m:oMathParaPr>
@@ -7652,7 +7793,7 @@
             </p:txBody>
           </p:sp>
         </mc:Choice>
-        <mc:Fallback>
+        <mc:Fallback xmlns="">
           <p:sp>
             <p:nvSpPr>
               <p:cNvPr id="4" name="TextBox 3"/>
@@ -7701,6 +7842,13 @@
   <p:clrMapOvr>
     <a:masterClrMapping/>
   </p:clrMapOvr>
+  <p:timing>
+    <p:tnLst>
+      <p:par>
+        <p:cTn id="1" dur="indefinite" restart="never" nodeType="tmRoot"/>
+      </p:par>
+    </p:tnLst>
+  </p:timing>
 </p:sld>
 </file>
 
@@ -7785,8 +7933,8 @@
           </a:p>
         </p:txBody>
       </p:sp>
-      <mc:AlternateContent xmlns:mc="http://schemas.openxmlformats.org/markup-compatibility/2006">
-        <mc:Choice xmlns:a14="http://schemas.microsoft.com/office/drawing/2010/main" Requires="a14">
+      <mc:AlternateContent xmlns:mc="http://schemas.openxmlformats.org/markup-compatibility/2006" xmlns:a14="http://schemas.microsoft.com/office/drawing/2010/main">
+        <mc:Choice Requires="a14">
           <p:sp>
             <p:nvSpPr>
               <p:cNvPr id="4" name="TextBox 3"/>
@@ -7809,6 +7957,7 @@
               </a:bodyPr>
               <a:lstStyle/>
               <a:p>
+                <a:pPr/>
                 <a14:m>
                   <m:oMathPara xmlns:m="http://schemas.openxmlformats.org/officeDocument/2006/math">
                     <m:oMathParaPr>
@@ -7835,7 +7984,7 @@
             </p:txBody>
           </p:sp>
         </mc:Choice>
-        <mc:Fallback>
+        <mc:Fallback xmlns="">
           <p:sp>
             <p:nvSpPr>
               <p:cNvPr id="4" name="TextBox 3"/>
@@ -8082,6 +8231,13 @@
   <p:clrMapOvr>
     <a:masterClrMapping/>
   </p:clrMapOvr>
+  <p:timing>
+    <p:tnLst>
+      <p:par>
+        <p:cTn id="1" dur="indefinite" restart="never" nodeType="tmRoot"/>
+      </p:par>
+    </p:tnLst>
+  </p:timing>
 </p:sld>
 </file>
 
@@ -8168,6 +8324,13 @@
   <p:clrMapOvr>
     <a:masterClrMapping/>
   </p:clrMapOvr>
+  <p:timing>
+    <p:tnLst>
+      <p:par>
+        <p:cTn id="1" dur="indefinite" restart="never" nodeType="tmRoot"/>
+      </p:par>
+    </p:tnLst>
+  </p:timing>
 </p:sld>
 </file>
 
@@ -8244,8 +8407,8 @@
           </a:p>
         </p:txBody>
       </p:sp>
-      <mc:AlternateContent xmlns:mc="http://schemas.openxmlformats.org/markup-compatibility/2006">
-        <mc:Choice xmlns:a14="http://schemas.microsoft.com/office/drawing/2010/main" Requires="a14">
+      <mc:AlternateContent xmlns:mc="http://schemas.openxmlformats.org/markup-compatibility/2006" xmlns:a14="http://schemas.microsoft.com/office/drawing/2010/main">
+        <mc:Choice Requires="a14">
           <p:sp>
             <p:nvSpPr>
               <p:cNvPr id="4" name="TextBox 3"/>
@@ -8268,6 +8431,7 @@
               </a:bodyPr>
               <a:lstStyle/>
               <a:p>
+                <a:pPr/>
                 <a14:m>
                   <m:oMathPara xmlns:m="http://schemas.openxmlformats.org/officeDocument/2006/math">
                     <m:oMathParaPr>
@@ -8319,7 +8483,7 @@
             </p:txBody>
           </p:sp>
         </mc:Choice>
-        <mc:Fallback>
+        <mc:Fallback xmlns="">
           <p:sp>
             <p:nvSpPr>
               <p:cNvPr id="4" name="TextBox 3"/>
@@ -8358,8 +8522,8 @@
           </p:sp>
         </mc:Fallback>
       </mc:AlternateContent>
-      <mc:AlternateContent xmlns:mc="http://schemas.openxmlformats.org/markup-compatibility/2006">
-        <mc:Choice xmlns:a14="http://schemas.microsoft.com/office/drawing/2010/main" Requires="a14">
+      <mc:AlternateContent xmlns:mc="http://schemas.openxmlformats.org/markup-compatibility/2006" xmlns:a14="http://schemas.microsoft.com/office/drawing/2010/main">
+        <mc:Choice Requires="a14">
           <p:sp>
             <p:nvSpPr>
               <p:cNvPr id="6" name="TextBox 5"/>
@@ -8382,6 +8546,7 @@
               </a:bodyPr>
               <a:lstStyle/>
               <a:p>
+                <a:pPr/>
                 <a14:m>
                   <m:oMathPara xmlns:m="http://schemas.openxmlformats.org/officeDocument/2006/math">
                     <m:oMathParaPr>
@@ -8433,7 +8598,7 @@
             </p:txBody>
           </p:sp>
         </mc:Choice>
-        <mc:Fallback>
+        <mc:Fallback xmlns="">
           <p:sp>
             <p:nvSpPr>
               <p:cNvPr id="6" name="TextBox 5"/>
@@ -8482,6 +8647,13 @@
   <p:clrMapOvr>
     <a:masterClrMapping/>
   </p:clrMapOvr>
+  <p:timing>
+    <p:tnLst>
+      <p:par>
+        <p:cTn id="1" dur="indefinite" restart="never" nodeType="tmRoot"/>
+      </p:par>
+    </p:tnLst>
+  </p:timing>
 </p:sld>
 </file>
 
@@ -8525,8 +8697,8 @@
           </a:p>
         </p:txBody>
       </p:sp>
-      <mc:AlternateContent xmlns:mc="http://schemas.openxmlformats.org/markup-compatibility/2006">
-        <mc:Choice xmlns:a14="http://schemas.microsoft.com/office/drawing/2010/main" Requires="a14">
+      <mc:AlternateContent xmlns:mc="http://schemas.openxmlformats.org/markup-compatibility/2006" xmlns:a14="http://schemas.microsoft.com/office/drawing/2010/main">
+        <mc:Choice Requires="a14">
           <p:sp>
             <p:nvSpPr>
               <p:cNvPr id="4" name="TextBox 3"/>
@@ -8549,6 +8721,7 @@
               </a:bodyPr>
               <a:lstStyle/>
               <a:p>
+                <a:pPr/>
                 <a14:m>
                   <m:oMathPara xmlns:m="http://schemas.openxmlformats.org/officeDocument/2006/math">
                     <m:oMathParaPr>
@@ -8744,7 +8917,7 @@
             </p:txBody>
           </p:sp>
         </mc:Choice>
-        <mc:Fallback>
+        <mc:Fallback xmlns="">
           <p:sp>
             <p:nvSpPr>
               <p:cNvPr id="4" name="TextBox 3"/>
@@ -8793,6 +8966,13 @@
   <p:clrMapOvr>
     <a:masterClrMapping/>
   </p:clrMapOvr>
+  <p:timing>
+    <p:tnLst>
+      <p:par>
+        <p:cTn id="1" dur="indefinite" restart="never" nodeType="tmRoot"/>
+      </p:par>
+    </p:tnLst>
+  </p:timing>
 </p:sld>
 </file>
 

</xml_diff>